<commit_message>
Updated URL-link in TLC-Club.pptx
</commit_message>
<xml_diff>
--- a/docs/TLC-Club.pptx
+++ b/docs/TLC-Club.pptx
@@ -7397,54 +7397,62 @@
           </a:bodyPr>
           <a:lstStyle/>
           <a:p>
-            <a:pPr marL="0" lvl="0" indent="0" algn="l" rtl="0">
-              <a:spcBef>
-                <a:spcPts val="0"/>
-              </a:spcBef>
-              <a:spcAft>
-                <a:spcPts val="0"/>
-              </a:spcAft>
-              <a:buNone/>
-            </a:pPr>
+            <a:pPr lvl="0"/>
             <a:r>
-              <a:rPr lang="ru" sz="4800" u="sng" dirty="0">
-                <a:solidFill>
-                  <a:schemeClr val="hlink"/>
-                </a:solidFill>
-                <a:hlinkClick r:id="rId3"/>
+              <a:rPr lang="en-US" sz="4800" i="1" u="sng" dirty="0" smtClean="0">
+                <a:solidFill>
+                  <a:srgbClr val="FF0000"/>
+                </a:solidFill>
               </a:rPr>
-              <a:t>tlc-club.glitch.me</a:t>
+              <a:t>tlcclub.glitch.me</a:t>
             </a:r>
-            <a:endParaRPr sz="4800" dirty="0"/>
+            <a:endParaRPr sz="4800" i="1" u="sng" dirty="0">
+              <a:solidFill>
+                <a:srgbClr val="FF0000"/>
+              </a:solidFill>
+            </a:endParaRPr>
           </a:p>
         </p:txBody>
       </p:sp>
       <p:pic>
         <p:nvPicPr>
-          <p:cNvPr id="86" name="Google Shape;86;p17"/>
-          <p:cNvPicPr preferRelativeResize="0"/>
+          <p:cNvPr id="1026" name="Picture 2" descr="http://qrcoder.ru/code/?https%3A%2F%2Ftlcclub.glitch.me%2Fhome&amp;10&amp;0"/>
+          <p:cNvPicPr>
+            <a:picLocks noChangeAspect="1" noChangeArrowheads="1"/>
+          </p:cNvPicPr>
           <p:nvPr/>
         </p:nvPicPr>
         <p:blipFill>
-          <a:blip r:embed="rId4">
-            <a:alphaModFix/>
+          <a:blip r:embed="rId3">
+            <a:extLst>
+              <a:ext uri="{28A0092B-C50C-407E-A947-70E740481C1C}">
+                <a14:useLocalDpi xmlns:a14="http://schemas.microsoft.com/office/drawing/2010/main" val="0"/>
+              </a:ext>
+            </a:extLst>
           </a:blip>
+          <a:srcRect/>
           <a:stretch>
             <a:fillRect/>
           </a:stretch>
         </p:blipFill>
-        <p:spPr>
+        <p:spPr bwMode="auto">
           <a:xfrm>
-            <a:off x="5158400" y="1387275"/>
-            <a:ext cx="3524250" cy="3524250"/>
+            <a:off x="5158399" y="1244700"/>
+            <a:ext cx="3524250" cy="3524251"/>
           </a:xfrm>
           <a:prstGeom prst="rect">
             <a:avLst/>
           </a:prstGeom>
           <a:noFill/>
-          <a:ln>
-            <a:noFill/>
-          </a:ln>
+          <a:extLst>
+            <a:ext uri="{909E8E84-426E-40DD-AFC4-6F175D3DCCD1}">
+              <a14:hiddenFill xmlns:a14="http://schemas.microsoft.com/office/drawing/2010/main">
+                <a:solidFill>
+                  <a:srgbClr val="FFFFFF"/>
+                </a:solidFill>
+              </a14:hiddenFill>
+            </a:ext>
+          </a:extLst>
         </p:spPr>
       </p:pic>
     </p:spTree>

</xml_diff>

<commit_message>
Updated URL-link in TLC-Club.pptx and added moder.py
</commit_message>
<xml_diff>
--- a/docs/TLC-Club.pptx
+++ b/docs/TLC-Club.pptx
@@ -7404,7 +7404,7 @@
                   <a:srgbClr val="FF0000"/>
                 </a:solidFill>
               </a:rPr>
-              <a:t>tlcclub.glitch.me</a:t>
+              <a:t>tlclub.glitch.me</a:t>
             </a:r>
             <a:endParaRPr sz="4800" i="1" u="sng" dirty="0">
               <a:solidFill>
@@ -7416,7 +7416,7 @@
       </p:sp>
       <p:pic>
         <p:nvPicPr>
-          <p:cNvPr id="1026" name="Picture 2" descr="http://qrcoder.ru/code/?https%3A%2F%2Ftlcclub.glitch.me%2Fhome&amp;10&amp;0"/>
+          <p:cNvPr id="2" name="Picture 2" descr="http://qrcoder.ru/code/?tlclub.glitch.me&amp;10&amp;0"/>
           <p:cNvPicPr>
             <a:picLocks noChangeAspect="1" noChangeArrowheads="1"/>
           </p:cNvPicPr>
@@ -7438,7 +7438,7 @@
         <p:spPr bwMode="auto">
           <a:xfrm>
             <a:off x="5158399" y="1244700"/>
-            <a:ext cx="3524250" cy="3524251"/>
+            <a:ext cx="3143250" cy="3143250"/>
           </a:xfrm>
           <a:prstGeom prst="rect">
             <a:avLst/>

</xml_diff>